<commit_message>
added option to bode plot inside S struct and modified sim_f SS_overall to read this
</commit_message>
<xml_diff>
--- a/doc/Limbs ppt Nov102015/Presentation1.pptx
+++ b/doc/Limbs ppt Nov102015/Presentation1.pptx
@@ -3539,6 +3539,13 @@
         </dgm:presLayoutVars>
       </dgm:prSet>
       <dgm:spPr/>
+      <dgm:t>
+        <a:bodyPr/>
+        <a:lstStyle/>
+        <a:p>
+          <a:endParaRPr lang="en-US"/>
+        </a:p>
+      </dgm:t>
     </dgm:pt>
     <dgm:pt modelId="{813E90B8-FA7C-486C-B481-8B7D76A7A408}" type="pres">
       <dgm:prSet presAssocID="{070C8D8F-9D13-406C-A82D-66ACCC0C2BE4}" presName="boxAndChildren" presStyleCnt="0"/>
@@ -3547,6 +3554,13 @@
     <dgm:pt modelId="{9426BC4C-7B6C-499B-957B-4D0E95FE90EB}" type="pres">
       <dgm:prSet presAssocID="{070C8D8F-9D13-406C-A82D-66ACCC0C2BE4}" presName="parentTextBox" presStyleLbl="node1" presStyleIdx="0" presStyleCnt="4"/>
       <dgm:spPr/>
+      <dgm:t>
+        <a:bodyPr/>
+        <a:lstStyle/>
+        <a:p>
+          <a:endParaRPr lang="en-US"/>
+        </a:p>
+      </dgm:t>
     </dgm:pt>
     <dgm:pt modelId="{01838E6E-F491-4AA5-906D-69A243ABCDE8}" type="pres">
       <dgm:prSet presAssocID="{27254683-8E27-4149-8CDB-886A91C90E9D}" presName="sp" presStyleCnt="0"/>
@@ -3559,6 +3573,13 @@
     <dgm:pt modelId="{A2EEAE53-6BC3-48D0-82D5-992064CDD48B}" type="pres">
       <dgm:prSet presAssocID="{74F84F72-73DA-4CE7-ADCF-586787288ACE}" presName="parentTextArrow" presStyleLbl="node1" presStyleIdx="1" presStyleCnt="4"/>
       <dgm:spPr/>
+      <dgm:t>
+        <a:bodyPr/>
+        <a:lstStyle/>
+        <a:p>
+          <a:endParaRPr lang="en-US"/>
+        </a:p>
+      </dgm:t>
     </dgm:pt>
     <dgm:pt modelId="{40FC4567-E7D7-4F70-9CD6-9E15D952D89E}" type="pres">
       <dgm:prSet presAssocID="{B895C6F0-145C-470D-891D-A7E936DEBF10}" presName="sp" presStyleCnt="0"/>
@@ -3571,6 +3592,13 @@
     <dgm:pt modelId="{79FE199A-B1CA-4C0D-9670-EB09869212F5}" type="pres">
       <dgm:prSet presAssocID="{7DE7004C-D27A-48C0-92DC-4DABD49133C7}" presName="parentTextArrow" presStyleLbl="node1" presStyleIdx="2" presStyleCnt="4"/>
       <dgm:spPr/>
+      <dgm:t>
+        <a:bodyPr/>
+        <a:lstStyle/>
+        <a:p>
+          <a:endParaRPr lang="en-US"/>
+        </a:p>
+      </dgm:t>
     </dgm:pt>
     <dgm:pt modelId="{46F874DD-C521-4852-9C99-0A40CCFCAE28}" type="pres">
       <dgm:prSet presAssocID="{4665EB08-67E8-4431-854E-350AE5A7EBF5}" presName="sp" presStyleCnt="0"/>
@@ -3583,29 +3611,36 @@
     <dgm:pt modelId="{D6DA09DB-76F1-4D0F-A171-BAB0C0691A25}" type="pres">
       <dgm:prSet presAssocID="{F7CAF51C-ABB0-4E17-B53D-2CD61D094452}" presName="parentTextArrow" presStyleLbl="node1" presStyleIdx="3" presStyleCnt="4"/>
       <dgm:spPr/>
+      <dgm:t>
+        <a:bodyPr/>
+        <a:lstStyle/>
+        <a:p>
+          <a:endParaRPr lang="en-US"/>
+        </a:p>
+      </dgm:t>
     </dgm:pt>
   </dgm:ptLst>
   <dgm:cxnLst>
-    <dgm:cxn modelId="{7B2559F0-0159-48EC-A577-A3558EFA52CC}" type="presOf" srcId="{070C8D8F-9D13-406C-A82D-66ACCC0C2BE4}" destId="{9426BC4C-7B6C-499B-957B-4D0E95FE90EB}" srcOrd="0" destOrd="0" presId="urn:microsoft.com/office/officeart/2005/8/layout/process4"/>
     <dgm:cxn modelId="{466DE299-43D3-402E-AB43-02348CE33464}" srcId="{E8445A36-C211-40E2-BD56-AF788527FD35}" destId="{7DE7004C-D27A-48C0-92DC-4DABD49133C7}" srcOrd="1" destOrd="0" parTransId="{11AE6E09-0895-4183-B3AF-F4978ADDBC44}" sibTransId="{B895C6F0-145C-470D-891D-A7E936DEBF10}"/>
-    <dgm:cxn modelId="{8F62A670-CD73-4D8C-80A8-C2D9772B4159}" type="presOf" srcId="{F7CAF51C-ABB0-4E17-B53D-2CD61D094452}" destId="{D6DA09DB-76F1-4D0F-A171-BAB0C0691A25}" srcOrd="0" destOrd="0" presId="urn:microsoft.com/office/officeart/2005/8/layout/process4"/>
-    <dgm:cxn modelId="{6E1B4341-4C1D-46E0-B2D1-45BA73D1D826}" type="presOf" srcId="{74F84F72-73DA-4CE7-ADCF-586787288ACE}" destId="{A2EEAE53-6BC3-48D0-82D5-992064CDD48B}" srcOrd="0" destOrd="0" presId="urn:microsoft.com/office/officeart/2005/8/layout/process4"/>
+    <dgm:cxn modelId="{A18F4EA0-9FE9-8642-A67A-9546FD41DAB4}" type="presOf" srcId="{070C8D8F-9D13-406C-A82D-66ACCC0C2BE4}" destId="{9426BC4C-7B6C-499B-957B-4D0E95FE90EB}" srcOrd="0" destOrd="0" presId="urn:microsoft.com/office/officeart/2005/8/layout/process4"/>
     <dgm:cxn modelId="{ADA525D9-C538-466E-8ECE-8CAB842E4C7D}" srcId="{E8445A36-C211-40E2-BD56-AF788527FD35}" destId="{F7CAF51C-ABB0-4E17-B53D-2CD61D094452}" srcOrd="0" destOrd="0" parTransId="{1C31AF47-2C56-4FEE-94CF-723FADF0A116}" sibTransId="{4665EB08-67E8-4431-854E-350AE5A7EBF5}"/>
-    <dgm:cxn modelId="{EFB0DC26-0746-4E75-AA91-B0D14682C7D1}" type="presOf" srcId="{E8445A36-C211-40E2-BD56-AF788527FD35}" destId="{7B3E8BB4-8D0C-4C06-80C7-74D4402DFDF7}" srcOrd="0" destOrd="0" presId="urn:microsoft.com/office/officeart/2005/8/layout/process4"/>
+    <dgm:cxn modelId="{6AC4537D-8AD6-E745-A662-21B1393E3FCC}" type="presOf" srcId="{7DE7004C-D27A-48C0-92DC-4DABD49133C7}" destId="{79FE199A-B1CA-4C0D-9670-EB09869212F5}" srcOrd="0" destOrd="0" presId="urn:microsoft.com/office/officeart/2005/8/layout/process4"/>
     <dgm:cxn modelId="{F9F8D5CC-E11B-490C-93DA-FBEECB16EA89}" srcId="{E8445A36-C211-40E2-BD56-AF788527FD35}" destId="{74F84F72-73DA-4CE7-ADCF-586787288ACE}" srcOrd="2" destOrd="0" parTransId="{C76371D4-954F-400C-A008-6EE5D3167C79}" sibTransId="{27254683-8E27-4149-8CDB-886A91C90E9D}"/>
-    <dgm:cxn modelId="{9ABD325B-141C-4EE4-ACF4-60B86670296D}" type="presOf" srcId="{7DE7004C-D27A-48C0-92DC-4DABD49133C7}" destId="{79FE199A-B1CA-4C0D-9670-EB09869212F5}" srcOrd="0" destOrd="0" presId="urn:microsoft.com/office/officeart/2005/8/layout/process4"/>
+    <dgm:cxn modelId="{0AE2BEBE-27F5-F84F-A1A8-92AFB1CBE002}" type="presOf" srcId="{74F84F72-73DA-4CE7-ADCF-586787288ACE}" destId="{A2EEAE53-6BC3-48D0-82D5-992064CDD48B}" srcOrd="0" destOrd="0" presId="urn:microsoft.com/office/officeart/2005/8/layout/process4"/>
     <dgm:cxn modelId="{4C124F7D-25F7-44FC-A91D-CAA420481CF5}" srcId="{E8445A36-C211-40E2-BD56-AF788527FD35}" destId="{070C8D8F-9D13-406C-A82D-66ACCC0C2BE4}" srcOrd="3" destOrd="0" parTransId="{72F24DBC-ECDF-46D0-AF7C-C6F9863DC449}" sibTransId="{98E4D18D-F8A1-4A95-AB13-C4C36E71D821}"/>
-    <dgm:cxn modelId="{3D3D37B4-EEAC-45B2-86A8-3B5AEAC307B5}" type="presParOf" srcId="{7B3E8BB4-8D0C-4C06-80C7-74D4402DFDF7}" destId="{813E90B8-FA7C-486C-B481-8B7D76A7A408}" srcOrd="0" destOrd="0" presId="urn:microsoft.com/office/officeart/2005/8/layout/process4"/>
-    <dgm:cxn modelId="{E880F175-DE8D-4ED2-911D-5C363D263B19}" type="presParOf" srcId="{813E90B8-FA7C-486C-B481-8B7D76A7A408}" destId="{9426BC4C-7B6C-499B-957B-4D0E95FE90EB}" srcOrd="0" destOrd="0" presId="urn:microsoft.com/office/officeart/2005/8/layout/process4"/>
-    <dgm:cxn modelId="{B037374B-4A03-4067-A0AA-D46BD3B3C812}" type="presParOf" srcId="{7B3E8BB4-8D0C-4C06-80C7-74D4402DFDF7}" destId="{01838E6E-F491-4AA5-906D-69A243ABCDE8}" srcOrd="1" destOrd="0" presId="urn:microsoft.com/office/officeart/2005/8/layout/process4"/>
-    <dgm:cxn modelId="{3E708465-F89B-48D8-8D66-2A27579120C4}" type="presParOf" srcId="{7B3E8BB4-8D0C-4C06-80C7-74D4402DFDF7}" destId="{8AD6464C-DE41-4B36-9A2F-B94664739799}" srcOrd="2" destOrd="0" presId="urn:microsoft.com/office/officeart/2005/8/layout/process4"/>
-    <dgm:cxn modelId="{A82DAEA8-6CD6-4256-A5ED-E445101FB2F1}" type="presParOf" srcId="{8AD6464C-DE41-4B36-9A2F-B94664739799}" destId="{A2EEAE53-6BC3-48D0-82D5-992064CDD48B}" srcOrd="0" destOrd="0" presId="urn:microsoft.com/office/officeart/2005/8/layout/process4"/>
-    <dgm:cxn modelId="{4C612302-5325-40B9-8BEA-1C65FAB1305A}" type="presParOf" srcId="{7B3E8BB4-8D0C-4C06-80C7-74D4402DFDF7}" destId="{40FC4567-E7D7-4F70-9CD6-9E15D952D89E}" srcOrd="3" destOrd="0" presId="urn:microsoft.com/office/officeart/2005/8/layout/process4"/>
-    <dgm:cxn modelId="{6E40F4E9-19B4-4110-9138-E54D2309E437}" type="presParOf" srcId="{7B3E8BB4-8D0C-4C06-80C7-74D4402DFDF7}" destId="{EFDEDA1A-1971-4C58-A80A-131F15E7AC74}" srcOrd="4" destOrd="0" presId="urn:microsoft.com/office/officeart/2005/8/layout/process4"/>
-    <dgm:cxn modelId="{5FDF3E40-E29F-4F0A-AF44-CED02B2C383A}" type="presParOf" srcId="{EFDEDA1A-1971-4C58-A80A-131F15E7AC74}" destId="{79FE199A-B1CA-4C0D-9670-EB09869212F5}" srcOrd="0" destOrd="0" presId="urn:microsoft.com/office/officeart/2005/8/layout/process4"/>
-    <dgm:cxn modelId="{8751409F-C1CE-40B2-BA63-9A4E95A486A8}" type="presParOf" srcId="{7B3E8BB4-8D0C-4C06-80C7-74D4402DFDF7}" destId="{46F874DD-C521-4852-9C99-0A40CCFCAE28}" srcOrd="5" destOrd="0" presId="urn:microsoft.com/office/officeart/2005/8/layout/process4"/>
-    <dgm:cxn modelId="{0A231BC5-CA72-49A7-8AB8-196EB8D10FF4}" type="presParOf" srcId="{7B3E8BB4-8D0C-4C06-80C7-74D4402DFDF7}" destId="{869073E8-4F7E-4432-9EE9-58886AD31DF7}" srcOrd="6" destOrd="0" presId="urn:microsoft.com/office/officeart/2005/8/layout/process4"/>
-    <dgm:cxn modelId="{600CA1FC-F7F8-4A19-96EA-B7D8D478B481}" type="presParOf" srcId="{869073E8-4F7E-4432-9EE9-58886AD31DF7}" destId="{D6DA09DB-76F1-4D0F-A171-BAB0C0691A25}" srcOrd="0" destOrd="0" presId="urn:microsoft.com/office/officeart/2005/8/layout/process4"/>
+    <dgm:cxn modelId="{49B822FE-6BF7-A748-8F4F-F075A4BF5786}" type="presOf" srcId="{F7CAF51C-ABB0-4E17-B53D-2CD61D094452}" destId="{D6DA09DB-76F1-4D0F-A171-BAB0C0691A25}" srcOrd="0" destOrd="0" presId="urn:microsoft.com/office/officeart/2005/8/layout/process4"/>
+    <dgm:cxn modelId="{80BB1003-9B87-634D-BD22-D8D9717996BF}" type="presOf" srcId="{E8445A36-C211-40E2-BD56-AF788527FD35}" destId="{7B3E8BB4-8D0C-4C06-80C7-74D4402DFDF7}" srcOrd="0" destOrd="0" presId="urn:microsoft.com/office/officeart/2005/8/layout/process4"/>
+    <dgm:cxn modelId="{DEA4CA59-FB03-CE45-9F9B-283A00FED97E}" type="presParOf" srcId="{7B3E8BB4-8D0C-4C06-80C7-74D4402DFDF7}" destId="{813E90B8-FA7C-486C-B481-8B7D76A7A408}" srcOrd="0" destOrd="0" presId="urn:microsoft.com/office/officeart/2005/8/layout/process4"/>
+    <dgm:cxn modelId="{22C46512-C45D-8E44-A690-1C77959B5FCA}" type="presParOf" srcId="{813E90B8-FA7C-486C-B481-8B7D76A7A408}" destId="{9426BC4C-7B6C-499B-957B-4D0E95FE90EB}" srcOrd="0" destOrd="0" presId="urn:microsoft.com/office/officeart/2005/8/layout/process4"/>
+    <dgm:cxn modelId="{F9831FC6-C617-AD4E-8655-665CBADF49A1}" type="presParOf" srcId="{7B3E8BB4-8D0C-4C06-80C7-74D4402DFDF7}" destId="{01838E6E-F491-4AA5-906D-69A243ABCDE8}" srcOrd="1" destOrd="0" presId="urn:microsoft.com/office/officeart/2005/8/layout/process4"/>
+    <dgm:cxn modelId="{D3934A53-248E-6D49-A241-C45712F70152}" type="presParOf" srcId="{7B3E8BB4-8D0C-4C06-80C7-74D4402DFDF7}" destId="{8AD6464C-DE41-4B36-9A2F-B94664739799}" srcOrd="2" destOrd="0" presId="urn:microsoft.com/office/officeart/2005/8/layout/process4"/>
+    <dgm:cxn modelId="{6BFFFB12-0A0D-A545-ADEF-655B477F863D}" type="presParOf" srcId="{8AD6464C-DE41-4B36-9A2F-B94664739799}" destId="{A2EEAE53-6BC3-48D0-82D5-992064CDD48B}" srcOrd="0" destOrd="0" presId="urn:microsoft.com/office/officeart/2005/8/layout/process4"/>
+    <dgm:cxn modelId="{72653AA7-5F9A-FE4D-B4C6-B4B99AACAF0F}" type="presParOf" srcId="{7B3E8BB4-8D0C-4C06-80C7-74D4402DFDF7}" destId="{40FC4567-E7D7-4F70-9CD6-9E15D952D89E}" srcOrd="3" destOrd="0" presId="urn:microsoft.com/office/officeart/2005/8/layout/process4"/>
+    <dgm:cxn modelId="{2AFAACDF-BB18-BB49-B816-16E3E4CC0B08}" type="presParOf" srcId="{7B3E8BB4-8D0C-4C06-80C7-74D4402DFDF7}" destId="{EFDEDA1A-1971-4C58-A80A-131F15E7AC74}" srcOrd="4" destOrd="0" presId="urn:microsoft.com/office/officeart/2005/8/layout/process4"/>
+    <dgm:cxn modelId="{D313C62F-F533-B64D-989F-58BD994AB02D}" type="presParOf" srcId="{EFDEDA1A-1971-4C58-A80A-131F15E7AC74}" destId="{79FE199A-B1CA-4C0D-9670-EB09869212F5}" srcOrd="0" destOrd="0" presId="urn:microsoft.com/office/officeart/2005/8/layout/process4"/>
+    <dgm:cxn modelId="{B75E8A54-CA2F-7C43-A536-A18AA4EF4954}" type="presParOf" srcId="{7B3E8BB4-8D0C-4C06-80C7-74D4402DFDF7}" destId="{46F874DD-C521-4852-9C99-0A40CCFCAE28}" srcOrd="5" destOrd="0" presId="urn:microsoft.com/office/officeart/2005/8/layout/process4"/>
+    <dgm:cxn modelId="{0F1C3DF3-7FF4-F849-8E3F-3DDE14073315}" type="presParOf" srcId="{7B3E8BB4-8D0C-4C06-80C7-74D4402DFDF7}" destId="{869073E8-4F7E-4432-9EE9-58886AD31DF7}" srcOrd="6" destOrd="0" presId="urn:microsoft.com/office/officeart/2005/8/layout/process4"/>
+    <dgm:cxn modelId="{D087D4EA-8435-8545-8EB5-042541D6610B}" type="presParOf" srcId="{869073E8-4F7E-4432-9EE9-58886AD31DF7}" destId="{D6DA09DB-76F1-4D0F-A171-BAB0C0691A25}" srcOrd="0" destOrd="0" presId="urn:microsoft.com/office/officeart/2005/8/layout/process4"/>
   </dgm:cxnLst>
   <dgm:bg/>
   <dgm:whole/>
@@ -3817,21 +3852,21 @@
     </dgm:pt>
   </dgm:ptLst>
   <dgm:cxnLst>
-    <dgm:cxn modelId="{BA5586F8-4D68-47B9-9FE5-62CBB8BAC4F8}" type="presOf" srcId="{3263C3E1-8B76-4D9E-B6E0-453F8D5B6B28}" destId="{0A4A0CBF-916D-446F-B652-281E88081B5E}" srcOrd="0" destOrd="0" presId="urn:microsoft.com/office/officeart/2005/8/layout/process4"/>
-    <dgm:cxn modelId="{A6A0A9CE-9595-4267-964C-11A625BC57F6}" type="presOf" srcId="{6F4A84DB-1A2E-447F-BB10-E35EAEAB3707}" destId="{932241EC-42EA-40F6-A579-94EBC65F14ED}" srcOrd="0" destOrd="0" presId="urn:microsoft.com/office/officeart/2005/8/layout/process4"/>
-    <dgm:cxn modelId="{F883C64C-B974-4E64-8047-26610999EB17}" srcId="{4BCE1CFD-BB8D-445E-B7C5-FDD751FC625C}" destId="{6F4A84DB-1A2E-447F-BB10-E35EAEAB3707}" srcOrd="0" destOrd="0" parTransId="{4F972897-AA48-4B81-8AE9-437A637C0D70}" sibTransId="{9EC29BC1-6AF6-4D3F-9DBD-5A82F962C213}"/>
+    <dgm:cxn modelId="{4BFA8F15-FDD0-6D41-B943-17AA0DEA4BF0}" type="presOf" srcId="{32E5AF96-4940-46E3-9FE4-A39CE57F3BE0}" destId="{80028070-17B8-4E12-881E-94195E084065}" srcOrd="0" destOrd="0" presId="urn:microsoft.com/office/officeart/2005/8/layout/process4"/>
     <dgm:cxn modelId="{DE2F382E-9BA2-4247-836B-FEDF5EEAF69F}" srcId="{4BCE1CFD-BB8D-445E-B7C5-FDD751FC625C}" destId="{32E5AF96-4940-46E3-9FE4-A39CE57F3BE0}" srcOrd="1" destOrd="0" parTransId="{D89D4591-244F-4377-8245-4C874D16480C}" sibTransId="{2E5FF21D-122A-470F-B09A-581DA462A2F4}"/>
     <dgm:cxn modelId="{349A5A85-46CE-4EFD-9EFD-B9A39744BC01}" srcId="{4BCE1CFD-BB8D-445E-B7C5-FDD751FC625C}" destId="{3263C3E1-8B76-4D9E-B6E0-453F8D5B6B28}" srcOrd="2" destOrd="0" parTransId="{C4D9D0E5-33F4-48CB-AFE8-4E7271DA0827}" sibTransId="{819DB24C-38FD-4394-8F6C-7A30E5D956DD}"/>
-    <dgm:cxn modelId="{A19A0809-43FD-438E-9FB8-6DEB28CCD068}" type="presOf" srcId="{32E5AF96-4940-46E3-9FE4-A39CE57F3BE0}" destId="{80028070-17B8-4E12-881E-94195E084065}" srcOrd="0" destOrd="0" presId="urn:microsoft.com/office/officeart/2005/8/layout/process4"/>
-    <dgm:cxn modelId="{786FF3D7-15EB-4088-A7AF-64550165217A}" type="presOf" srcId="{4BCE1CFD-BB8D-445E-B7C5-FDD751FC625C}" destId="{06DA3D67-941C-45DC-9FE3-F868EB3C4702}" srcOrd="0" destOrd="0" presId="urn:microsoft.com/office/officeart/2005/8/layout/process4"/>
-    <dgm:cxn modelId="{219934E9-4D75-4D5C-85E0-E6EBC3400E6E}" type="presParOf" srcId="{06DA3D67-941C-45DC-9FE3-F868EB3C4702}" destId="{B8FA59CA-40A7-4D11-B7DB-CDEB0F3BBC92}" srcOrd="0" destOrd="0" presId="urn:microsoft.com/office/officeart/2005/8/layout/process4"/>
-    <dgm:cxn modelId="{0A136D02-3AA9-41A7-AEBD-1509BC347D0D}" type="presParOf" srcId="{B8FA59CA-40A7-4D11-B7DB-CDEB0F3BBC92}" destId="{0A4A0CBF-916D-446F-B652-281E88081B5E}" srcOrd="0" destOrd="0" presId="urn:microsoft.com/office/officeart/2005/8/layout/process4"/>
-    <dgm:cxn modelId="{49F86317-8EBC-4C29-8392-B917E2D5B707}" type="presParOf" srcId="{06DA3D67-941C-45DC-9FE3-F868EB3C4702}" destId="{A3D93AFB-AEA3-4A11-8545-0A237FCA55FB}" srcOrd="1" destOrd="0" presId="urn:microsoft.com/office/officeart/2005/8/layout/process4"/>
-    <dgm:cxn modelId="{CA48E786-D89C-4575-93FD-357C70AC7216}" type="presParOf" srcId="{06DA3D67-941C-45DC-9FE3-F868EB3C4702}" destId="{7282DEED-DA59-4C4C-92AE-10B53CA53B42}" srcOrd="2" destOrd="0" presId="urn:microsoft.com/office/officeart/2005/8/layout/process4"/>
-    <dgm:cxn modelId="{662B5849-C9BF-44C5-841F-0618EC2F69F9}" type="presParOf" srcId="{7282DEED-DA59-4C4C-92AE-10B53CA53B42}" destId="{80028070-17B8-4E12-881E-94195E084065}" srcOrd="0" destOrd="0" presId="urn:microsoft.com/office/officeart/2005/8/layout/process4"/>
-    <dgm:cxn modelId="{B37681F7-259E-47FB-A7F9-C53C3F80D292}" type="presParOf" srcId="{06DA3D67-941C-45DC-9FE3-F868EB3C4702}" destId="{AE18ED1E-1B7B-4372-A540-7FB603214E64}" srcOrd="3" destOrd="0" presId="urn:microsoft.com/office/officeart/2005/8/layout/process4"/>
-    <dgm:cxn modelId="{3DD28CAA-6899-43B1-A9D4-E76D9E11C3A7}" type="presParOf" srcId="{06DA3D67-941C-45DC-9FE3-F868EB3C4702}" destId="{D9486351-1461-4EB9-BB2B-24744DC91E2C}" srcOrd="4" destOrd="0" presId="urn:microsoft.com/office/officeart/2005/8/layout/process4"/>
-    <dgm:cxn modelId="{A1318AD8-8AE3-48D3-A8E0-1E24DC8544F1}" type="presParOf" srcId="{D9486351-1461-4EB9-BB2B-24744DC91E2C}" destId="{932241EC-42EA-40F6-A579-94EBC65F14ED}" srcOrd="0" destOrd="0" presId="urn:microsoft.com/office/officeart/2005/8/layout/process4"/>
+    <dgm:cxn modelId="{4DA2987D-E95C-8B4C-93D7-2BEC04155CC8}" type="presOf" srcId="{6F4A84DB-1A2E-447F-BB10-E35EAEAB3707}" destId="{932241EC-42EA-40F6-A579-94EBC65F14ED}" srcOrd="0" destOrd="0" presId="urn:microsoft.com/office/officeart/2005/8/layout/process4"/>
+    <dgm:cxn modelId="{F883C64C-B974-4E64-8047-26610999EB17}" srcId="{4BCE1CFD-BB8D-445E-B7C5-FDD751FC625C}" destId="{6F4A84DB-1A2E-447F-BB10-E35EAEAB3707}" srcOrd="0" destOrd="0" parTransId="{4F972897-AA48-4B81-8AE9-437A637C0D70}" sibTransId="{9EC29BC1-6AF6-4D3F-9DBD-5A82F962C213}"/>
+    <dgm:cxn modelId="{4350FC3D-877A-114B-AB74-C0F1F2DA803D}" type="presOf" srcId="{4BCE1CFD-BB8D-445E-B7C5-FDD751FC625C}" destId="{06DA3D67-941C-45DC-9FE3-F868EB3C4702}" srcOrd="0" destOrd="0" presId="urn:microsoft.com/office/officeart/2005/8/layout/process4"/>
+    <dgm:cxn modelId="{77DE2EE9-9866-0547-A5FE-866E61A6BB01}" type="presOf" srcId="{3263C3E1-8B76-4D9E-B6E0-453F8D5B6B28}" destId="{0A4A0CBF-916D-446F-B652-281E88081B5E}" srcOrd="0" destOrd="0" presId="urn:microsoft.com/office/officeart/2005/8/layout/process4"/>
+    <dgm:cxn modelId="{FC3E2E61-51B6-AE42-9620-FA41B9176BFF}" type="presParOf" srcId="{06DA3D67-941C-45DC-9FE3-F868EB3C4702}" destId="{B8FA59CA-40A7-4D11-B7DB-CDEB0F3BBC92}" srcOrd="0" destOrd="0" presId="urn:microsoft.com/office/officeart/2005/8/layout/process4"/>
+    <dgm:cxn modelId="{AC51A00D-DE2C-764C-A047-ABA557EC0174}" type="presParOf" srcId="{B8FA59CA-40A7-4D11-B7DB-CDEB0F3BBC92}" destId="{0A4A0CBF-916D-446F-B652-281E88081B5E}" srcOrd="0" destOrd="0" presId="urn:microsoft.com/office/officeart/2005/8/layout/process4"/>
+    <dgm:cxn modelId="{D16B1DD9-D924-7641-888D-85112EBEEA51}" type="presParOf" srcId="{06DA3D67-941C-45DC-9FE3-F868EB3C4702}" destId="{A3D93AFB-AEA3-4A11-8545-0A237FCA55FB}" srcOrd="1" destOrd="0" presId="urn:microsoft.com/office/officeart/2005/8/layout/process4"/>
+    <dgm:cxn modelId="{F88C6B94-20E5-A648-BE42-7623B80FC050}" type="presParOf" srcId="{06DA3D67-941C-45DC-9FE3-F868EB3C4702}" destId="{7282DEED-DA59-4C4C-92AE-10B53CA53B42}" srcOrd="2" destOrd="0" presId="urn:microsoft.com/office/officeart/2005/8/layout/process4"/>
+    <dgm:cxn modelId="{D073FC71-9AFB-704A-9F45-048D3805E15C}" type="presParOf" srcId="{7282DEED-DA59-4C4C-92AE-10B53CA53B42}" destId="{80028070-17B8-4E12-881E-94195E084065}" srcOrd="0" destOrd="0" presId="urn:microsoft.com/office/officeart/2005/8/layout/process4"/>
+    <dgm:cxn modelId="{D9918208-84EA-5741-AA46-70D8F81381CC}" type="presParOf" srcId="{06DA3D67-941C-45DC-9FE3-F868EB3C4702}" destId="{AE18ED1E-1B7B-4372-A540-7FB603214E64}" srcOrd="3" destOrd="0" presId="urn:microsoft.com/office/officeart/2005/8/layout/process4"/>
+    <dgm:cxn modelId="{B0B5534A-5BD1-2644-9800-E7A9C01D2A8F}" type="presParOf" srcId="{06DA3D67-941C-45DC-9FE3-F868EB3C4702}" destId="{D9486351-1461-4EB9-BB2B-24744DC91E2C}" srcOrd="4" destOrd="0" presId="urn:microsoft.com/office/officeart/2005/8/layout/process4"/>
+    <dgm:cxn modelId="{677ACDBF-72E5-EE48-9721-6C22317038BA}" type="presParOf" srcId="{D9486351-1461-4EB9-BB2B-24744DC91E2C}" destId="{932241EC-42EA-40F6-A579-94EBC65F14ED}" srcOrd="0" destOrd="0" presId="urn:microsoft.com/office/officeart/2005/8/layout/process4"/>
   </dgm:cxnLst>
   <dgm:bg/>
   <dgm:whole/>
@@ -3980,6 +4015,13 @@
         </dgm:presLayoutVars>
       </dgm:prSet>
       <dgm:spPr/>
+      <dgm:t>
+        <a:bodyPr/>
+        <a:lstStyle/>
+        <a:p>
+          <a:endParaRPr lang="en-US"/>
+        </a:p>
+      </dgm:t>
     </dgm:pt>
     <dgm:pt modelId="{6CAC8078-B3E3-4682-A1F1-910A578EDEAC}" type="pres">
       <dgm:prSet presAssocID="{AA6A8722-5831-4CD6-9D8B-A2E9A3697B4B}" presName="boxAndChildren" presStyleCnt="0"/>
@@ -3988,6 +4030,13 @@
     <dgm:pt modelId="{BFCB5271-8BCE-4EFA-AF8A-CE9CD978FB7C}" type="pres">
       <dgm:prSet presAssocID="{AA6A8722-5831-4CD6-9D8B-A2E9A3697B4B}" presName="parentTextBox" presStyleLbl="node1" presStyleIdx="0" presStyleCnt="3"/>
       <dgm:spPr/>
+      <dgm:t>
+        <a:bodyPr/>
+        <a:lstStyle/>
+        <a:p>
+          <a:endParaRPr lang="en-US"/>
+        </a:p>
+      </dgm:t>
     </dgm:pt>
     <dgm:pt modelId="{D6B2C330-F6D6-4C0F-A937-F828F06B0CEB}" type="pres">
       <dgm:prSet presAssocID="{33D621DA-466F-47FE-A084-DC322B82225D}" presName="sp" presStyleCnt="0"/>
@@ -4000,6 +4049,13 @@
     <dgm:pt modelId="{71C307AC-DC8C-44CB-A8D9-B641143A97EB}" type="pres">
       <dgm:prSet presAssocID="{8097FFF0-00F7-4D7C-A1DD-195B9296D793}" presName="parentTextArrow" presStyleLbl="node1" presStyleIdx="1" presStyleCnt="3"/>
       <dgm:spPr/>
+      <dgm:t>
+        <a:bodyPr/>
+        <a:lstStyle/>
+        <a:p>
+          <a:endParaRPr lang="en-US"/>
+        </a:p>
+      </dgm:t>
     </dgm:pt>
     <dgm:pt modelId="{D8B68305-7EDD-4CE7-90E7-5EE106AEEBBE}" type="pres">
       <dgm:prSet presAssocID="{B35E0E8E-6D63-4B09-838D-D34130E80DA6}" presName="sp" presStyleCnt="0"/>
@@ -4012,24 +4068,31 @@
     <dgm:pt modelId="{EAAEC06C-D057-4190-87EF-DB92BE80AA04}" type="pres">
       <dgm:prSet presAssocID="{DE38C9D7-35F6-43F1-B7AF-B71AE2B01E93}" presName="parentTextArrow" presStyleLbl="node1" presStyleIdx="2" presStyleCnt="3"/>
       <dgm:spPr/>
+      <dgm:t>
+        <a:bodyPr/>
+        <a:lstStyle/>
+        <a:p>
+          <a:endParaRPr lang="en-US"/>
+        </a:p>
+      </dgm:t>
     </dgm:pt>
   </dgm:ptLst>
   <dgm:cxnLst>
-    <dgm:cxn modelId="{B52E0086-F8C7-41CC-9316-86A16D53E324}" type="presOf" srcId="{DE38C9D7-35F6-43F1-B7AF-B71AE2B01E93}" destId="{EAAEC06C-D057-4190-87EF-DB92BE80AA04}" srcOrd="0" destOrd="0" presId="urn:microsoft.com/office/officeart/2005/8/layout/process4"/>
     <dgm:cxn modelId="{F92270F4-4670-4D91-A4B1-C4DECA2C706F}" srcId="{925E8A4A-8AB3-4492-88F0-25B5359B8013}" destId="{DE38C9D7-35F6-43F1-B7AF-B71AE2B01E93}" srcOrd="0" destOrd="0" parTransId="{E7E33705-5E98-4720-9E66-72EC9AC011C9}" sibTransId="{B35E0E8E-6D63-4B09-838D-D34130E80DA6}"/>
-    <dgm:cxn modelId="{1D02DD67-1368-4F22-A615-84BD413571D7}" type="presOf" srcId="{AA6A8722-5831-4CD6-9D8B-A2E9A3697B4B}" destId="{BFCB5271-8BCE-4EFA-AF8A-CE9CD978FB7C}" srcOrd="0" destOrd="0" presId="urn:microsoft.com/office/officeart/2005/8/layout/process4"/>
+    <dgm:cxn modelId="{C1ACAD4D-6EDE-EF44-9B04-7DECF86191BC}" type="presOf" srcId="{925E8A4A-8AB3-4492-88F0-25B5359B8013}" destId="{4CE3CFD4-D72C-4E14-ABF8-D285BB53211B}" srcOrd="0" destOrd="0" presId="urn:microsoft.com/office/officeart/2005/8/layout/process4"/>
+    <dgm:cxn modelId="{4739776B-565F-5240-AD67-9C84080F86D7}" type="presOf" srcId="{8097FFF0-00F7-4D7C-A1DD-195B9296D793}" destId="{71C307AC-DC8C-44CB-A8D9-B641143A97EB}" srcOrd="0" destOrd="0" presId="urn:microsoft.com/office/officeart/2005/8/layout/process4"/>
+    <dgm:cxn modelId="{035F9096-99F4-1942-99BF-E3915565240D}" type="presOf" srcId="{AA6A8722-5831-4CD6-9D8B-A2E9A3697B4B}" destId="{BFCB5271-8BCE-4EFA-AF8A-CE9CD978FB7C}" srcOrd="0" destOrd="0" presId="urn:microsoft.com/office/officeart/2005/8/layout/process4"/>
     <dgm:cxn modelId="{2B6006CB-C6B9-41C0-AB52-346D377EBCD9}" srcId="{925E8A4A-8AB3-4492-88F0-25B5359B8013}" destId="{8097FFF0-00F7-4D7C-A1DD-195B9296D793}" srcOrd="1" destOrd="0" parTransId="{7DB0EC34-380A-4E94-81F3-F6AEBEFDDD97}" sibTransId="{33D621DA-466F-47FE-A084-DC322B82225D}"/>
     <dgm:cxn modelId="{CF6C1A95-7C3E-446E-98BE-1C0E423D5569}" srcId="{925E8A4A-8AB3-4492-88F0-25B5359B8013}" destId="{AA6A8722-5831-4CD6-9D8B-A2E9A3697B4B}" srcOrd="2" destOrd="0" parTransId="{50232FE1-E025-4556-BB0C-54EEFEE107AA}" sibTransId="{93EC304D-26DF-408A-8510-7524CE614D61}"/>
-    <dgm:cxn modelId="{BCD1281A-B36F-460B-BC00-E5697710491C}" type="presOf" srcId="{8097FFF0-00F7-4D7C-A1DD-195B9296D793}" destId="{71C307AC-DC8C-44CB-A8D9-B641143A97EB}" srcOrd="0" destOrd="0" presId="urn:microsoft.com/office/officeart/2005/8/layout/process4"/>
-    <dgm:cxn modelId="{E4BF2CFB-F768-436C-B82F-B17BEE54B38F}" type="presOf" srcId="{925E8A4A-8AB3-4492-88F0-25B5359B8013}" destId="{4CE3CFD4-D72C-4E14-ABF8-D285BB53211B}" srcOrd="0" destOrd="0" presId="urn:microsoft.com/office/officeart/2005/8/layout/process4"/>
-    <dgm:cxn modelId="{4647B655-C161-484A-A8CB-E77FA62D19B0}" type="presParOf" srcId="{4CE3CFD4-D72C-4E14-ABF8-D285BB53211B}" destId="{6CAC8078-B3E3-4682-A1F1-910A578EDEAC}" srcOrd="0" destOrd="0" presId="urn:microsoft.com/office/officeart/2005/8/layout/process4"/>
-    <dgm:cxn modelId="{7DD5409F-90F7-4950-9FD0-A771F6E6C07C}" type="presParOf" srcId="{6CAC8078-B3E3-4682-A1F1-910A578EDEAC}" destId="{BFCB5271-8BCE-4EFA-AF8A-CE9CD978FB7C}" srcOrd="0" destOrd="0" presId="urn:microsoft.com/office/officeart/2005/8/layout/process4"/>
-    <dgm:cxn modelId="{140FD244-7232-4C57-8BBF-E91399694594}" type="presParOf" srcId="{4CE3CFD4-D72C-4E14-ABF8-D285BB53211B}" destId="{D6B2C330-F6D6-4C0F-A937-F828F06B0CEB}" srcOrd="1" destOrd="0" presId="urn:microsoft.com/office/officeart/2005/8/layout/process4"/>
-    <dgm:cxn modelId="{0976034F-646D-4D88-B798-54EF80294445}" type="presParOf" srcId="{4CE3CFD4-D72C-4E14-ABF8-D285BB53211B}" destId="{A63AFFF2-9CB2-48CF-B424-EC7C1701CD61}" srcOrd="2" destOrd="0" presId="urn:microsoft.com/office/officeart/2005/8/layout/process4"/>
-    <dgm:cxn modelId="{CC6E857B-9E05-49AC-A86B-3C67355D2114}" type="presParOf" srcId="{A63AFFF2-9CB2-48CF-B424-EC7C1701CD61}" destId="{71C307AC-DC8C-44CB-A8D9-B641143A97EB}" srcOrd="0" destOrd="0" presId="urn:microsoft.com/office/officeart/2005/8/layout/process4"/>
-    <dgm:cxn modelId="{FADEAA33-D0BC-43DE-8366-0922B0F5A43F}" type="presParOf" srcId="{4CE3CFD4-D72C-4E14-ABF8-D285BB53211B}" destId="{D8B68305-7EDD-4CE7-90E7-5EE106AEEBBE}" srcOrd="3" destOrd="0" presId="urn:microsoft.com/office/officeart/2005/8/layout/process4"/>
-    <dgm:cxn modelId="{C3FBE148-AC1E-4FE1-A0AE-AD7A33556D26}" type="presParOf" srcId="{4CE3CFD4-D72C-4E14-ABF8-D285BB53211B}" destId="{70EFF318-EEE7-473A-B49F-1C0F988FEEDC}" srcOrd="4" destOrd="0" presId="urn:microsoft.com/office/officeart/2005/8/layout/process4"/>
-    <dgm:cxn modelId="{47BCF8E0-25CE-4F79-AB74-63B0D4771BC1}" type="presParOf" srcId="{70EFF318-EEE7-473A-B49F-1C0F988FEEDC}" destId="{EAAEC06C-D057-4190-87EF-DB92BE80AA04}" srcOrd="0" destOrd="0" presId="urn:microsoft.com/office/officeart/2005/8/layout/process4"/>
+    <dgm:cxn modelId="{25BA489D-31B9-1749-A0B5-895DF374CF17}" type="presOf" srcId="{DE38C9D7-35F6-43F1-B7AF-B71AE2B01E93}" destId="{EAAEC06C-D057-4190-87EF-DB92BE80AA04}" srcOrd="0" destOrd="0" presId="urn:microsoft.com/office/officeart/2005/8/layout/process4"/>
+    <dgm:cxn modelId="{555DF54E-DA32-024A-8B15-15C4C5489850}" type="presParOf" srcId="{4CE3CFD4-D72C-4E14-ABF8-D285BB53211B}" destId="{6CAC8078-B3E3-4682-A1F1-910A578EDEAC}" srcOrd="0" destOrd="0" presId="urn:microsoft.com/office/officeart/2005/8/layout/process4"/>
+    <dgm:cxn modelId="{38483C9E-2309-3245-972D-0C0CE2DBB240}" type="presParOf" srcId="{6CAC8078-B3E3-4682-A1F1-910A578EDEAC}" destId="{BFCB5271-8BCE-4EFA-AF8A-CE9CD978FB7C}" srcOrd="0" destOrd="0" presId="urn:microsoft.com/office/officeart/2005/8/layout/process4"/>
+    <dgm:cxn modelId="{CE78CDFF-A48A-CE47-BFB1-112C351B070B}" type="presParOf" srcId="{4CE3CFD4-D72C-4E14-ABF8-D285BB53211B}" destId="{D6B2C330-F6D6-4C0F-A937-F828F06B0CEB}" srcOrd="1" destOrd="0" presId="urn:microsoft.com/office/officeart/2005/8/layout/process4"/>
+    <dgm:cxn modelId="{E49F5F41-2673-1544-AEBC-872AC704EAD7}" type="presParOf" srcId="{4CE3CFD4-D72C-4E14-ABF8-D285BB53211B}" destId="{A63AFFF2-9CB2-48CF-B424-EC7C1701CD61}" srcOrd="2" destOrd="0" presId="urn:microsoft.com/office/officeart/2005/8/layout/process4"/>
+    <dgm:cxn modelId="{20BC8154-FA67-1A48-9173-F5300730F7FF}" type="presParOf" srcId="{A63AFFF2-9CB2-48CF-B424-EC7C1701CD61}" destId="{71C307AC-DC8C-44CB-A8D9-B641143A97EB}" srcOrd="0" destOrd="0" presId="urn:microsoft.com/office/officeart/2005/8/layout/process4"/>
+    <dgm:cxn modelId="{13A1997B-3925-8F43-BEDA-205E27086B61}" type="presParOf" srcId="{4CE3CFD4-D72C-4E14-ABF8-D285BB53211B}" destId="{D8B68305-7EDD-4CE7-90E7-5EE106AEEBBE}" srcOrd="3" destOrd="0" presId="urn:microsoft.com/office/officeart/2005/8/layout/process4"/>
+    <dgm:cxn modelId="{B0A340DA-A70B-7B4F-975B-066EE7C0A875}" type="presParOf" srcId="{4CE3CFD4-D72C-4E14-ABF8-D285BB53211B}" destId="{70EFF318-EEE7-473A-B49F-1C0F988FEEDC}" srcOrd="4" destOrd="0" presId="urn:microsoft.com/office/officeart/2005/8/layout/process4"/>
+    <dgm:cxn modelId="{8F425990-F2EB-8C41-A261-547EB4E97C07}" type="presParOf" srcId="{70EFF318-EEE7-473A-B49F-1C0F988FEEDC}" destId="{EAAEC06C-D057-4190-87EF-DB92BE80AA04}" srcOrd="0" destOrd="0" presId="urn:microsoft.com/office/officeart/2005/8/layout/process4"/>
   </dgm:cxnLst>
   <dgm:bg/>
   <dgm:whole/>
@@ -4139,6 +4202,13 @@
         </dgm:presLayoutVars>
       </dgm:prSet>
       <dgm:spPr/>
+      <dgm:t>
+        <a:bodyPr/>
+        <a:lstStyle/>
+        <a:p>
+          <a:endParaRPr lang="en-US"/>
+        </a:p>
+      </dgm:t>
     </dgm:pt>
     <dgm:pt modelId="{0F1F843C-FFB2-4B45-915C-D0139EB99ABC}" type="pres">
       <dgm:prSet presAssocID="{043C9E28-A1EF-4956-B4E0-781BF81356EA}" presName="arrow" presStyleLbl="bgShp" presStyleIdx="0" presStyleCnt="1"/>
@@ -4155,6 +4225,13 @@
         </dgm:presLayoutVars>
       </dgm:prSet>
       <dgm:spPr/>
+      <dgm:t>
+        <a:bodyPr/>
+        <a:lstStyle/>
+        <a:p>
+          <a:endParaRPr lang="en-US"/>
+        </a:p>
+      </dgm:t>
     </dgm:pt>
     <dgm:pt modelId="{C999B68D-873C-4DBF-9929-64E0B3F6ADC9}" type="pres">
       <dgm:prSet presAssocID="{F8F86827-06FB-48A0-BD14-1B969A72122C}" presName="sibTrans" presStyleCnt="0"/>
@@ -4167,19 +4244,26 @@
         </dgm:presLayoutVars>
       </dgm:prSet>
       <dgm:spPr/>
+      <dgm:t>
+        <a:bodyPr/>
+        <a:lstStyle/>
+        <a:p>
+          <a:endParaRPr lang="en-US"/>
+        </a:p>
+      </dgm:t>
     </dgm:pt>
   </dgm:ptLst>
   <dgm:cxnLst>
     <dgm:cxn modelId="{FF7FD5F2-D525-4E36-A0B3-6022B185121E}" srcId="{043C9E28-A1EF-4956-B4E0-781BF81356EA}" destId="{26EE7222-4240-4CAD-A1B8-EC0986D4D86F}" srcOrd="0" destOrd="0" parTransId="{87C97D66-83E3-4CDB-8959-33D48082FDB0}" sibTransId="{F8F86827-06FB-48A0-BD14-1B969A72122C}"/>
+    <dgm:cxn modelId="{19B4D02B-342D-0B40-8919-40233B8E7E93}" type="presOf" srcId="{043C9E28-A1EF-4956-B4E0-781BF81356EA}" destId="{0915716E-0486-46EA-81BD-CE349EF7AEA3}" srcOrd="0" destOrd="0" presId="urn:microsoft.com/office/officeart/2005/8/layout/hProcess9"/>
+    <dgm:cxn modelId="{CC22C322-9460-F749-8AEF-43BFD66AED6F}" type="presOf" srcId="{26EE7222-4240-4CAD-A1B8-EC0986D4D86F}" destId="{D327F22F-3EB7-4EA0-9B92-A3A9A9CCACEB}" srcOrd="0" destOrd="0" presId="urn:microsoft.com/office/officeart/2005/8/layout/hProcess9"/>
     <dgm:cxn modelId="{DF512D12-E1C3-4E64-A4BC-7E88D3EA64A3}" srcId="{043C9E28-A1EF-4956-B4E0-781BF81356EA}" destId="{8A298290-DBFB-41B2-811E-2BB22944F8B7}" srcOrd="1" destOrd="0" parTransId="{1E0B57AD-62A3-4815-8D58-A1F029EB9E43}" sibTransId="{395FB6C3-8457-4165-A715-876DF4589FF8}"/>
-    <dgm:cxn modelId="{417EF53A-1C11-4883-B836-4B837AB92818}" type="presOf" srcId="{043C9E28-A1EF-4956-B4E0-781BF81356EA}" destId="{0915716E-0486-46EA-81BD-CE349EF7AEA3}" srcOrd="0" destOrd="0" presId="urn:microsoft.com/office/officeart/2005/8/layout/hProcess9"/>
-    <dgm:cxn modelId="{DCEA19CC-DF7D-4A48-8F7E-6E24521D11EE}" type="presOf" srcId="{26EE7222-4240-4CAD-A1B8-EC0986D4D86F}" destId="{D327F22F-3EB7-4EA0-9B92-A3A9A9CCACEB}" srcOrd="0" destOrd="0" presId="urn:microsoft.com/office/officeart/2005/8/layout/hProcess9"/>
-    <dgm:cxn modelId="{11160C8E-6636-4678-89DA-F73B2DEB42B6}" type="presOf" srcId="{8A298290-DBFB-41B2-811E-2BB22944F8B7}" destId="{CE076159-3A01-4C51-B7A3-BED8BFD49361}" srcOrd="0" destOrd="0" presId="urn:microsoft.com/office/officeart/2005/8/layout/hProcess9"/>
-    <dgm:cxn modelId="{1CF971B8-84BB-45C1-B517-67B29A8E28C7}" type="presParOf" srcId="{0915716E-0486-46EA-81BD-CE349EF7AEA3}" destId="{0F1F843C-FFB2-4B45-915C-D0139EB99ABC}" srcOrd="0" destOrd="0" presId="urn:microsoft.com/office/officeart/2005/8/layout/hProcess9"/>
-    <dgm:cxn modelId="{8D2053E4-5D3C-440E-84BC-1481FCEB4BDE}" type="presParOf" srcId="{0915716E-0486-46EA-81BD-CE349EF7AEA3}" destId="{ADBC1661-A959-47B8-999D-9E7E628DF644}" srcOrd="1" destOrd="0" presId="urn:microsoft.com/office/officeart/2005/8/layout/hProcess9"/>
-    <dgm:cxn modelId="{DF05668E-8667-47EB-A773-7B3F7E2C3B6C}" type="presParOf" srcId="{ADBC1661-A959-47B8-999D-9E7E628DF644}" destId="{D327F22F-3EB7-4EA0-9B92-A3A9A9CCACEB}" srcOrd="0" destOrd="0" presId="urn:microsoft.com/office/officeart/2005/8/layout/hProcess9"/>
-    <dgm:cxn modelId="{88E02C28-2D21-4B64-A7BD-F28AC6E9D69B}" type="presParOf" srcId="{ADBC1661-A959-47B8-999D-9E7E628DF644}" destId="{C999B68D-873C-4DBF-9929-64E0B3F6ADC9}" srcOrd="1" destOrd="0" presId="urn:microsoft.com/office/officeart/2005/8/layout/hProcess9"/>
-    <dgm:cxn modelId="{66104CFF-F683-4129-B716-EDC8996D1533}" type="presParOf" srcId="{ADBC1661-A959-47B8-999D-9E7E628DF644}" destId="{CE076159-3A01-4C51-B7A3-BED8BFD49361}" srcOrd="2" destOrd="0" presId="urn:microsoft.com/office/officeart/2005/8/layout/hProcess9"/>
+    <dgm:cxn modelId="{CDCB7137-91C7-1B48-9DBE-84B5DE0CC752}" type="presOf" srcId="{8A298290-DBFB-41B2-811E-2BB22944F8B7}" destId="{CE076159-3A01-4C51-B7A3-BED8BFD49361}" srcOrd="0" destOrd="0" presId="urn:microsoft.com/office/officeart/2005/8/layout/hProcess9"/>
+    <dgm:cxn modelId="{FD188674-BD8B-1744-907A-C8905DD6C2DF}" type="presParOf" srcId="{0915716E-0486-46EA-81BD-CE349EF7AEA3}" destId="{0F1F843C-FFB2-4B45-915C-D0139EB99ABC}" srcOrd="0" destOrd="0" presId="urn:microsoft.com/office/officeart/2005/8/layout/hProcess9"/>
+    <dgm:cxn modelId="{58257F90-542E-F346-B94E-442CB73E575E}" type="presParOf" srcId="{0915716E-0486-46EA-81BD-CE349EF7AEA3}" destId="{ADBC1661-A959-47B8-999D-9E7E628DF644}" srcOrd="1" destOrd="0" presId="urn:microsoft.com/office/officeart/2005/8/layout/hProcess9"/>
+    <dgm:cxn modelId="{E60D248F-ADF1-2243-9259-B5A34FDF24A8}" type="presParOf" srcId="{ADBC1661-A959-47B8-999D-9E7E628DF644}" destId="{D327F22F-3EB7-4EA0-9B92-A3A9A9CCACEB}" srcOrd="0" destOrd="0" presId="urn:microsoft.com/office/officeart/2005/8/layout/hProcess9"/>
+    <dgm:cxn modelId="{ACA4A327-9904-5A4D-B833-8D2C756D15AE}" type="presParOf" srcId="{ADBC1661-A959-47B8-999D-9E7E628DF644}" destId="{C999B68D-873C-4DBF-9929-64E0B3F6ADC9}" srcOrd="1" destOrd="0" presId="urn:microsoft.com/office/officeart/2005/8/layout/hProcess9"/>
+    <dgm:cxn modelId="{FDA427FD-0708-C04C-9A4D-85D2D9C6C04B}" type="presParOf" srcId="{ADBC1661-A959-47B8-999D-9E7E628DF644}" destId="{CE076159-3A01-4C51-B7A3-BED8BFD49361}" srcOrd="2" destOrd="0" presId="urn:microsoft.com/office/officeart/2005/8/layout/hProcess9"/>
   </dgm:cxnLst>
   <dgm:bg/>
   <dgm:whole/>
@@ -10658,7 +10742,7 @@
           <a:p>
             <a:fld id="{AB47A379-70B9-4EAE-B5C4-90A2CF39918B}" type="datetimeFigureOut">
               <a:rPr lang="en-US"/>
-              <a:t>11/10/2015</a:t>
+              <a:t>2/25/16</a:t>
             </a:fld>
             <a:endParaRPr lang="en-US"/>
           </a:p>
@@ -12663,7 +12747,7 @@
           <a:p>
             <a:fld id="{C764DE79-268F-4C1A-8933-263129D2AF90}" type="datetimeFigureOut">
               <a:rPr lang="en-US" dirty="0"/>
-              <a:t>11/10/2015</a:t>
+              <a:t>2/25/16</a:t>
             </a:fld>
             <a:endParaRPr lang="en-US" dirty="0"/>
           </a:p>
@@ -12828,7 +12912,7 @@
           <a:p>
             <a:fld id="{C764DE79-268F-4C1A-8933-263129D2AF90}" type="datetimeFigureOut">
               <a:rPr lang="en-US" dirty="0"/>
-              <a:t>11/10/2015</a:t>
+              <a:t>2/25/16</a:t>
             </a:fld>
             <a:endParaRPr lang="en-US" dirty="0"/>
           </a:p>
@@ -13003,7 +13087,7 @@
           <a:p>
             <a:fld id="{C764DE79-268F-4C1A-8933-263129D2AF90}" type="datetimeFigureOut">
               <a:rPr lang="en-US" dirty="0"/>
-              <a:t>11/10/2015</a:t>
+              <a:t>2/25/16</a:t>
             </a:fld>
             <a:endParaRPr lang="en-US" dirty="0"/>
           </a:p>
@@ -13168,7 +13252,7 @@
           <a:p>
             <a:fld id="{C764DE79-268F-4C1A-8933-263129D2AF90}" type="datetimeFigureOut">
               <a:rPr lang="en-US" dirty="0"/>
-              <a:t>11/10/2015</a:t>
+              <a:t>2/25/16</a:t>
             </a:fld>
             <a:endParaRPr lang="en-US" dirty="0"/>
           </a:p>
@@ -13409,7 +13493,7 @@
           <a:p>
             <a:fld id="{C764DE79-268F-4C1A-8933-263129D2AF90}" type="datetimeFigureOut">
               <a:rPr lang="en-US" dirty="0"/>
-              <a:t>11/10/2015</a:t>
+              <a:t>2/25/16</a:t>
             </a:fld>
             <a:endParaRPr lang="en-US" dirty="0"/>
           </a:p>
@@ -13636,7 +13720,7 @@
           <a:p>
             <a:fld id="{C764DE79-268F-4C1A-8933-263129D2AF90}" type="datetimeFigureOut">
               <a:rPr lang="en-US" dirty="0"/>
-              <a:t>11/10/2015</a:t>
+              <a:t>2/25/16</a:t>
             </a:fld>
             <a:endParaRPr lang="en-US" dirty="0"/>
           </a:p>
@@ -13998,7 +14082,7 @@
           <a:p>
             <a:fld id="{C764DE79-268F-4C1A-8933-263129D2AF90}" type="datetimeFigureOut">
               <a:rPr lang="en-US" dirty="0"/>
-              <a:t>11/10/2015</a:t>
+              <a:t>2/25/16</a:t>
             </a:fld>
             <a:endParaRPr lang="en-US" dirty="0"/>
           </a:p>
@@ -14111,7 +14195,7 @@
           <a:p>
             <a:fld id="{C764DE79-268F-4C1A-8933-263129D2AF90}" type="datetimeFigureOut">
               <a:rPr lang="en-US" dirty="0"/>
-              <a:t>11/10/2015</a:t>
+              <a:t>2/25/16</a:t>
             </a:fld>
             <a:endParaRPr lang="en-US" dirty="0"/>
           </a:p>
@@ -14201,7 +14285,7 @@
           <a:p>
             <a:fld id="{C764DE79-268F-4C1A-8933-263129D2AF90}" type="datetimeFigureOut">
               <a:rPr lang="en-US" dirty="0"/>
-              <a:t>11/10/2015</a:t>
+              <a:t>2/25/16</a:t>
             </a:fld>
             <a:endParaRPr lang="en-US" dirty="0"/>
           </a:p>
@@ -14473,7 +14557,7 @@
           <a:p>
             <a:fld id="{C764DE79-268F-4C1A-8933-263129D2AF90}" type="datetimeFigureOut">
               <a:rPr lang="en-US" dirty="0"/>
-              <a:t>11/10/2015</a:t>
+              <a:t>2/25/16</a:t>
             </a:fld>
             <a:endParaRPr lang="en-US" dirty="0"/>
           </a:p>
@@ -14725,7 +14809,7 @@
           <a:p>
             <a:fld id="{C764DE79-268F-4C1A-8933-263129D2AF90}" type="datetimeFigureOut">
               <a:rPr lang="en-US" dirty="0"/>
-              <a:t>11/10/2015</a:t>
+              <a:t>2/25/16</a:t>
             </a:fld>
             <a:endParaRPr lang="en-US" dirty="0"/>
           </a:p>
@@ -14933,7 +15017,7 @@
           <a:p>
             <a:fld id="{C764DE79-268F-4C1A-8933-263129D2AF90}" type="datetimeFigureOut">
               <a:rPr lang="en-US" dirty="0"/>
-              <a:t>11/10/2015</a:t>
+              <a:t>2/25/16</a:t>
             </a:fld>
             <a:endParaRPr lang="en-US" dirty="0"/>
           </a:p>
@@ -15644,8 +15728,8 @@
           </a:p>
         </p:txBody>
       </p:sp>
-      <mc:AlternateContent xmlns:mc="http://schemas.openxmlformats.org/markup-compatibility/2006">
-        <mc:Choice xmlns:a14="http://schemas.microsoft.com/office/drawing/2010/main" Requires="a14">
+      <mc:AlternateContent xmlns:mc="http://schemas.openxmlformats.org/markup-compatibility/2006" xmlns:a14="http://schemas.microsoft.com/office/drawing/2010/main">
+        <mc:Choice Requires="a14">
           <p:sp>
             <p:nvSpPr>
               <p:cNvPr id="3" name="Content Placeholder 2"/>
@@ -15681,7 +15765,7 @@
                           <m:chr m:val="̇"/>
                           <m:ctrlPr>
                             <a:rPr lang="en-US" b="0" i="1" smtClean="0">
-                              <a:latin typeface="Cambria Math" panose="02040503050406030204" pitchFamily="18" charset="0"/>
+                              <a:latin typeface="Cambria Math" charset="0"/>
                             </a:rPr>
                           </m:ctrlPr>
                         </m:accPr>
@@ -15690,7 +15774,7 @@
                             <m:sSubPr>
                               <m:ctrlPr>
                                 <a:rPr lang="en-US" b="0" i="1" smtClean="0">
-                                  <a:latin typeface="Cambria Math" panose="02040503050406030204" pitchFamily="18" charset="0"/>
+                                  <a:latin typeface="Cambria Math" charset="0"/>
                                 </a:rPr>
                               </m:ctrlPr>
                             </m:sSubPr>
@@ -15723,7 +15807,7 @@
                         <m:sSubPr>
                           <m:ctrlPr>
                             <a:rPr lang="en-US" b="0" i="1" smtClean="0">
-                              <a:latin typeface="Cambria Math" panose="02040503050406030204" pitchFamily="18" charset="0"/>
+                              <a:latin typeface="Cambria Math" charset="0"/>
                             </a:rPr>
                           </m:ctrlPr>
                         </m:sSubPr>
@@ -15772,7 +15856,7 @@
                           <m:chr m:val="̇"/>
                           <m:ctrlPr>
                             <a:rPr lang="en-US" i="1">
-                              <a:latin typeface="Cambria Math" panose="02040503050406030204" pitchFamily="18" charset="0"/>
+                              <a:latin typeface="Cambria Math" charset="0"/>
                             </a:rPr>
                           </m:ctrlPr>
                         </m:accPr>
@@ -15781,7 +15865,7 @@
                             <m:sSubPr>
                               <m:ctrlPr>
                                 <a:rPr lang="en-US" i="1">
-                                  <a:latin typeface="Cambria Math" panose="02040503050406030204" pitchFamily="18" charset="0"/>
+                                  <a:latin typeface="Cambria Math" charset="0"/>
                                 </a:rPr>
                               </m:ctrlPr>
                             </m:sSubPr>
@@ -15820,7 +15904,7 @@
                         <m:fPr>
                           <m:ctrlPr>
                             <a:rPr lang="en-US" b="0" i="1" smtClean="0">
-                              <a:latin typeface="Cambria Math" panose="02040503050406030204" pitchFamily="18" charset="0"/>
+                              <a:latin typeface="Cambria Math" charset="0"/>
                             </a:rPr>
                           </m:ctrlPr>
                         </m:fPr>
@@ -15845,7 +15929,7 @@
                         <m:sSubPr>
                           <m:ctrlPr>
                             <a:rPr lang="en-US" b="0" i="1" smtClean="0">
-                              <a:latin typeface="Cambria Math" panose="02040503050406030204" pitchFamily="18" charset="0"/>
+                              <a:latin typeface="Cambria Math" charset="0"/>
                             </a:rPr>
                           </m:ctrlPr>
                         </m:sSubPr>
@@ -15876,7 +15960,7 @@
                         <m:fPr>
                           <m:ctrlPr>
                             <a:rPr lang="en-US" b="0" i="1" smtClean="0">
-                              <a:latin typeface="Cambria Math" panose="02040503050406030204" pitchFamily="18" charset="0"/>
+                              <a:latin typeface="Cambria Math" charset="0"/>
                             </a:rPr>
                           </m:ctrlPr>
                         </m:fPr>
@@ -15942,7 +16026,7 @@
                         <m:fPr>
                           <m:ctrlPr>
                             <a:rPr lang="en-US" b="0" i="1" smtClean="0">
-                              <a:latin typeface="Cambria Math" panose="02040503050406030204" pitchFamily="18" charset="0"/>
+                              <a:latin typeface="Cambria Math" charset="0"/>
                             </a:rPr>
                           </m:ctrlPr>
                         </m:fPr>
@@ -15973,7 +16057,7 @@
                         <m:dPr>
                           <m:ctrlPr>
                             <a:rPr lang="en-US" b="0" i="1" smtClean="0">
-                              <a:latin typeface="Cambria Math" panose="02040503050406030204" pitchFamily="18" charset="0"/>
+                              <a:latin typeface="Cambria Math" charset="0"/>
                             </a:rPr>
                           </m:ctrlPr>
                         </m:dPr>
@@ -15982,7 +16066,7 @@
                             <m:sSubPr>
                               <m:ctrlPr>
                                 <a:rPr lang="en-US" b="0" i="1" smtClean="0">
-                                  <a:latin typeface="Cambria Math" panose="02040503050406030204" pitchFamily="18" charset="0"/>
+                                  <a:latin typeface="Cambria Math" charset="0"/>
                                 </a:rPr>
                               </m:ctrlPr>
                             </m:sSubPr>
@@ -16015,7 +16099,7 @@
                         <m:sSupPr>
                           <m:ctrlPr>
                             <a:rPr lang="en-US" b="0" i="1" smtClean="0">
-                              <a:latin typeface="Cambria Math" panose="02040503050406030204" pitchFamily="18" charset="0"/>
+                              <a:latin typeface="Cambria Math" charset="0"/>
                             </a:rPr>
                           </m:ctrlPr>
                         </m:sSupPr>
@@ -16040,7 +16124,7 @@
                         <m:dPr>
                           <m:ctrlPr>
                             <a:rPr lang="en-US" b="0" i="1" smtClean="0">
-                              <a:latin typeface="Cambria Math" panose="02040503050406030204" pitchFamily="18" charset="0"/>
+                              <a:latin typeface="Cambria Math" charset="0"/>
                             </a:rPr>
                           </m:ctrlPr>
                         </m:dPr>
@@ -16049,7 +16133,7 @@
                             <m:sSubPr>
                               <m:ctrlPr>
                                 <a:rPr lang="en-US" b="0" i="1" smtClean="0">
-                                  <a:latin typeface="Cambria Math" panose="02040503050406030204" pitchFamily="18" charset="0"/>
+                                  <a:latin typeface="Cambria Math" charset="0"/>
                                 </a:rPr>
                               </m:ctrlPr>
                             </m:sSubPr>
@@ -16076,7 +16160,7 @@
                         <m:sSubPr>
                           <m:ctrlPr>
                             <a:rPr lang="en-US" b="0" i="1" smtClean="0">
-                              <a:latin typeface="Cambria Math" panose="02040503050406030204" pitchFamily="18" charset="0"/>
+                              <a:latin typeface="Cambria Math" charset="0"/>
                             </a:rPr>
                           </m:ctrlPr>
                         </m:sSubPr>
@@ -16114,7 +16198,7 @@
             </p:txBody>
           </p:sp>
         </mc:Choice>
-        <mc:Fallback>
+        <mc:Fallback xmlns="">
           <p:sp>
             <p:nvSpPr>
               <p:cNvPr id="3" name="Content Placeholder 2"/>
@@ -16229,7 +16313,6 @@
               <a:rPr lang="en-US" dirty="0" smtClean="0"/>
               <a:t>Linearization to give LTI system results in unobservable system</a:t>
             </a:r>
-            <a:endParaRPr lang="en-US" dirty="0" smtClean="0"/>
           </a:p>
           <a:p>
             <a:endParaRPr lang="en-US" dirty="0" smtClean="0"/>
@@ -16436,8 +16519,8 @@
           </a:p>
         </p:txBody>
       </p:sp>
-      <mc:AlternateContent xmlns:mc="http://schemas.openxmlformats.org/markup-compatibility/2006">
-        <mc:Choice xmlns:a14="http://schemas.microsoft.com/office/drawing/2010/main" Requires="a14">
+      <mc:AlternateContent xmlns:mc="http://schemas.openxmlformats.org/markup-compatibility/2006" xmlns:a14="http://schemas.microsoft.com/office/drawing/2010/main">
+        <mc:Choice Requires="a14">
           <p:sp>
             <p:nvSpPr>
               <p:cNvPr id="6" name="Content Placeholder 5"/>
@@ -16500,7 +16583,7 @@
                         <m:supHide m:val="on"/>
                         <m:ctrlPr>
                           <a:rPr lang="en-US" b="0" i="1" smtClean="0">
-                            <a:latin typeface="Cambria Math" panose="02040503050406030204" pitchFamily="18" charset="0"/>
+                            <a:latin typeface="Cambria Math" charset="0"/>
                           </a:rPr>
                         </m:ctrlPr>
                       </m:naryPr>
@@ -16521,7 +16604,7 @@
                           <m:dPr>
                             <m:ctrlPr>
                               <a:rPr lang="en-US" b="0" i="1" smtClean="0">
-                                <a:latin typeface="Cambria Math" panose="02040503050406030204" pitchFamily="18" charset="0"/>
+                                <a:latin typeface="Cambria Math" charset="0"/>
                               </a:rPr>
                             </m:ctrlPr>
                           </m:dPr>
@@ -16530,7 +16613,7 @@
                               <m:sSubPr>
                                 <m:ctrlPr>
                                   <a:rPr lang="en-US" b="0" i="1" smtClean="0">
-                                    <a:latin typeface="Cambria Math" panose="02040503050406030204" pitchFamily="18" charset="0"/>
+                                    <a:latin typeface="Cambria Math" charset="0"/>
                                   </a:rPr>
                                 </m:ctrlPr>
                               </m:sSubPr>
@@ -16555,7 +16638,7 @@
                               <m:dPr>
                                 <m:ctrlPr>
                                   <a:rPr lang="en-US" b="0" i="1" smtClean="0">
-                                    <a:latin typeface="Cambria Math" panose="02040503050406030204" pitchFamily="18" charset="0"/>
+                                    <a:latin typeface="Cambria Math" charset="0"/>
                                   </a:rPr>
                                 </m:ctrlPr>
                               </m:dPr>
@@ -16584,7 +16667,7 @@
                               <m:dPr>
                                 <m:ctrlPr>
                                   <a:rPr lang="en-US" b="0" i="1" smtClean="0">
-                                    <a:latin typeface="Cambria Math" panose="02040503050406030204" pitchFamily="18" charset="0"/>
+                                    <a:latin typeface="Cambria Math" charset="0"/>
                                   </a:rPr>
                                 </m:ctrlPr>
                               </m:dPr>
@@ -16603,7 +16686,7 @@
                           <m:sSupPr>
                             <m:ctrlPr>
                               <a:rPr lang="en-US" b="0" i="1" smtClean="0">
-                                <a:latin typeface="Cambria Math" panose="02040503050406030204" pitchFamily="18" charset="0"/>
+                                <a:latin typeface="Cambria Math" charset="0"/>
                               </a:rPr>
                             </m:ctrlPr>
                           </m:sSupPr>
@@ -16626,7 +16709,7 @@
                               <m:sSubPr>
                                 <m:ctrlPr>
                                   <a:rPr lang="en-US" i="1">
-                                    <a:latin typeface="Cambria Math" panose="02040503050406030204" pitchFamily="18" charset="0"/>
+                                    <a:latin typeface="Cambria Math" charset="0"/>
                                   </a:rPr>
                                 </m:ctrlPr>
                               </m:sSubPr>
@@ -16702,7 +16785,7 @@
                       <m:sSubPr>
                         <m:ctrlPr>
                           <a:rPr lang="en-US" b="0" i="1" smtClean="0">
-                            <a:latin typeface="Cambria Math" panose="02040503050406030204" pitchFamily="18" charset="0"/>
+                            <a:latin typeface="Cambria Math" charset="0"/>
                           </a:rPr>
                         </m:ctrlPr>
                       </m:sSubPr>
@@ -16745,7 +16828,7 @@
                       <m:dPr>
                         <m:ctrlPr>
                           <a:rPr lang="en-US" b="0" i="1" smtClean="0">
-                            <a:latin typeface="Cambria Math" panose="02040503050406030204" pitchFamily="18" charset="0"/>
+                            <a:latin typeface="Cambria Math" charset="0"/>
                           </a:rPr>
                         </m:ctrlPr>
                       </m:dPr>
@@ -16754,7 +16837,7 @@
                           <m:sSubPr>
                             <m:ctrlPr>
                               <a:rPr lang="en-US" b="0" i="1" smtClean="0">
-                                <a:latin typeface="Cambria Math" panose="02040503050406030204" pitchFamily="18" charset="0"/>
+                                <a:latin typeface="Cambria Math" charset="0"/>
                               </a:rPr>
                             </m:ctrlPr>
                           </m:sSubPr>
@@ -16793,7 +16876,7 @@
                       <m:sSupPr>
                         <m:ctrlPr>
                           <a:rPr lang="en-US" b="0" i="1" smtClean="0">
-                            <a:latin typeface="Cambria Math" panose="02040503050406030204" pitchFamily="18" charset="0"/>
+                            <a:latin typeface="Cambria Math" charset="0"/>
                           </a:rPr>
                         </m:ctrlPr>
                       </m:sSupPr>
@@ -16816,7 +16899,7 @@
                           <m:sSubPr>
                             <m:ctrlPr>
                               <a:rPr lang="en-US" b="0" i="1" smtClean="0">
-                                <a:latin typeface="Cambria Math" panose="02040503050406030204" pitchFamily="18" charset="0"/>
+                                <a:latin typeface="Cambria Math" charset="0"/>
                               </a:rPr>
                             </m:ctrlPr>
                           </m:sSubPr>
@@ -16855,7 +16938,7 @@
                       <m:dPr>
                         <m:ctrlPr>
                           <a:rPr lang="en-US" i="1">
-                            <a:latin typeface="Cambria Math" panose="02040503050406030204" pitchFamily="18" charset="0"/>
+                            <a:latin typeface="Cambria Math" charset="0"/>
                           </a:rPr>
                         </m:ctrlPr>
                       </m:dPr>
@@ -16864,7 +16947,7 @@
                           <m:sSubPr>
                             <m:ctrlPr>
                               <a:rPr lang="en-US" i="1">
-                                <a:latin typeface="Cambria Math" panose="02040503050406030204" pitchFamily="18" charset="0"/>
+                                <a:latin typeface="Cambria Math" charset="0"/>
                               </a:rPr>
                             </m:ctrlPr>
                           </m:sSubPr>
@@ -16909,7 +16992,7 @@
                       <m:sSupPr>
                         <m:ctrlPr>
                           <a:rPr lang="en-US" i="1">
-                            <a:latin typeface="Cambria Math" panose="02040503050406030204" pitchFamily="18" charset="0"/>
+                            <a:latin typeface="Cambria Math" charset="0"/>
                           </a:rPr>
                         </m:ctrlPr>
                       </m:sSupPr>
@@ -16938,7 +17021,7 @@
                           <m:sSubPr>
                             <m:ctrlPr>
                               <a:rPr lang="en-US" i="1">
-                                <a:latin typeface="Cambria Math" panose="02040503050406030204" pitchFamily="18" charset="0"/>
+                                <a:latin typeface="Cambria Math" charset="0"/>
                               </a:rPr>
                             </m:ctrlPr>
                           </m:sSubPr>
@@ -16978,7 +17061,7 @@
             </p:txBody>
           </p:sp>
         </mc:Choice>
-        <mc:Fallback>
+        <mc:Fallback xmlns="">
           <p:sp>
             <p:nvSpPr>
               <p:cNvPr id="6" name="Content Placeholder 5"/>
@@ -17072,8 +17155,8 @@
           </a:p>
         </p:txBody>
       </p:sp>
-      <mc:AlternateContent xmlns:mc="http://schemas.openxmlformats.org/markup-compatibility/2006">
-        <mc:Choice xmlns:a14="http://schemas.microsoft.com/office/drawing/2010/main" Requires="a14">
+      <mc:AlternateContent xmlns:mc="http://schemas.openxmlformats.org/markup-compatibility/2006" xmlns:a14="http://schemas.microsoft.com/office/drawing/2010/main">
+        <mc:Choice Requires="a14">
           <p:sp>
             <p:nvSpPr>
               <p:cNvPr id="3" name="Content Placeholder 2"/>
@@ -17108,11 +17191,7 @@
                 </a:pPr>
                 <a:r>
                   <a:rPr lang="en-US" sz="2800" dirty="0"/>
-                  <a:t>	</a:t>
-                </a:r>
-                <a:r>
-                  <a:rPr lang="en-US" sz="2800" dirty="0"/>
-                  <a:t> 	</a:t>
+                  <a:t>	 	</a:t>
                 </a:r>
                 <a:r>
                   <a:rPr lang="en-US" sz="2800" dirty="0" smtClean="0"/>
@@ -17139,7 +17218,7 @@
                         <m:sSubPr>
                           <m:ctrlPr>
                             <a:rPr lang="en-US" sz="2400" b="0" i="1" smtClean="0">
-                              <a:latin typeface="Cambria Math" panose="02040503050406030204" pitchFamily="18" charset="0"/>
+                              <a:latin typeface="Cambria Math" charset="0"/>
                             </a:rPr>
                           </m:ctrlPr>
                         </m:sSubPr>
@@ -17170,7 +17249,7 @@
                         <m:fPr>
                           <m:ctrlPr>
                             <a:rPr lang="en-US" sz="2400" b="0" i="1" smtClean="0">
-                              <a:latin typeface="Cambria Math" panose="02040503050406030204" pitchFamily="18" charset="0"/>
+                              <a:latin typeface="Cambria Math" charset="0"/>
                             </a:rPr>
                           </m:ctrlPr>
                         </m:fPr>
@@ -17268,7 +17347,7 @@
                         <m:endChr m:val="]"/>
                         <m:ctrlPr>
                           <a:rPr lang="en-US" sz="2800" i="1">
-                            <a:latin typeface="Cambria Math" panose="02040503050406030204" pitchFamily="18" charset="0"/>
+                            <a:latin typeface="Cambria Math" charset="0"/>
                           </a:rPr>
                         </m:ctrlPr>
                       </m:dPr>
@@ -17283,7 +17362,7 @@
                           <m:sSubPr>
                             <m:ctrlPr>
                               <a:rPr lang="en-US" sz="2800" i="1">
-                                <a:latin typeface="Cambria Math" panose="02040503050406030204" pitchFamily="18" charset="0"/>
+                                <a:latin typeface="Cambria Math" charset="0"/>
                               </a:rPr>
                             </m:ctrlPr>
                           </m:sSubPr>
@@ -17354,7 +17433,7 @@
             </p:txBody>
           </p:sp>
         </mc:Choice>
-        <mc:Fallback>
+        <mc:Fallback xmlns="">
           <p:sp>
             <p:nvSpPr>
               <p:cNvPr id="3" name="Content Placeholder 2"/>
@@ -17516,7 +17595,7 @@
         </p:blipFill>
         <p:spPr>
           <a:xfrm>
-            <a:off x="2524106" y="1282276"/>
+            <a:off x="2524106" y="1315486"/>
             <a:ext cx="8535423" cy="2417150"/>
           </a:xfrm>
         </p:spPr>
@@ -17557,16 +17636,15 @@
           </p:cNvPicPr>
           <p:nvPr/>
         </p:nvPicPr>
-        <p:blipFill>
+        <p:blipFill rotWithShape="1">
           <a:blip r:embed="rId4"/>
-          <a:stretch>
-            <a:fillRect/>
-          </a:stretch>
+          <a:srcRect t="343" b="343"/>
+          <a:stretch/>
         </p:blipFill>
         <p:spPr>
           <a:xfrm>
-            <a:off x="2524106" y="3939482"/>
-            <a:ext cx="6251291" cy="2331658"/>
+            <a:off x="2524106" y="3947481"/>
+            <a:ext cx="6251291" cy="2315661"/>
           </a:xfrm>
           <a:prstGeom prst="rect">
             <a:avLst/>
@@ -17653,15 +17731,7 @@
           <a:p>
             <a:r>
               <a:rPr lang="en-US" dirty="0" smtClean="0"/>
-              <a:t>Observability guaranteed </a:t>
-            </a:r>
-            <a:r>
-              <a:rPr lang="en-US" dirty="0" smtClean="0"/>
-              <a:t>with just one sensor for any </a:t>
-            </a:r>
-            <a:r>
-              <a:rPr lang="en-US" dirty="0" smtClean="0"/>
-              <a:t>scene.</a:t>
+              <a:t>Observability guaranteed with just one sensor for any scene.</a:t>
             </a:r>
           </a:p>
           <a:p>
@@ -17822,11 +17892,7 @@
           <a:p>
             <a:r>
               <a:rPr lang="en-US" dirty="0" smtClean="0"/>
-              <a:t>Active </a:t>
-            </a:r>
-            <a:r>
-              <a:rPr lang="en-US" dirty="0" smtClean="0"/>
-              <a:t>Sensing in Biological Systems</a:t>
+              <a:t>Active Sensing in Biological Systems</a:t>
             </a:r>
             <a:endParaRPr lang="en-US" dirty="0"/>
           </a:p>
@@ -18038,11 +18104,7 @@
           <a:p>
             <a:r>
               <a:rPr lang="en-US" dirty="0" smtClean="0"/>
-              <a:t>Kernel Based observing of sensory </a:t>
-            </a:r>
-            <a:r>
-              <a:rPr lang="en-US" dirty="0" smtClean="0"/>
-              <a:t>scenes</a:t>
+              <a:t>Kernel Based observing of sensory scenes</a:t>
             </a:r>
             <a:endParaRPr lang="en-US" dirty="0"/>
           </a:p>
@@ -18341,7 +18403,7 @@
                           <m:chr m:val="̇"/>
                           <m:ctrlPr>
                             <a:rPr lang="en-US" i="1">
-                              <a:latin typeface="Cambria Math" panose="02040503050406030204" pitchFamily="18" charset="0"/>
+                              <a:latin typeface="Cambria Math" charset="0"/>
                             </a:rPr>
                           </m:ctrlPr>
                         </m:accPr>
@@ -18370,7 +18432,7 @@
                         <m:dPr>
                           <m:ctrlPr>
                             <a:rPr lang="en-US" i="1">
-                              <a:latin typeface="Cambria Math" panose="02040503050406030204" pitchFamily="18" charset="0"/>
+                              <a:latin typeface="Cambria Math" charset="0"/>
                             </a:rPr>
                           </m:ctrlPr>
                         </m:dPr>
@@ -18394,7 +18456,7 @@
                           <m:chr m:val="∑"/>
                           <m:ctrlPr>
                             <a:rPr lang="en-US" i="1">
-                              <a:latin typeface="Cambria Math" panose="02040503050406030204" pitchFamily="18" charset="0"/>
+                              <a:latin typeface="Cambria Math" charset="0"/>
                             </a:rPr>
                           </m:ctrlPr>
                         </m:naryPr>
@@ -18428,7 +18490,7 @@
                             <m:sSubPr>
                               <m:ctrlPr>
                                 <a:rPr lang="en-US" i="1">
-                                  <a:latin typeface="Cambria Math" panose="02040503050406030204" pitchFamily="18" charset="0"/>
+                                  <a:latin typeface="Cambria Math" charset="0"/>
                                 </a:rPr>
                               </m:ctrlPr>
                             </m:sSubPr>
@@ -18453,7 +18515,7 @@
                             <m:dPr>
                               <m:ctrlPr>
                                 <a:rPr lang="en-US" i="1">
-                                  <a:latin typeface="Cambria Math" panose="02040503050406030204" pitchFamily="18" charset="0"/>
+                                  <a:latin typeface="Cambria Math" charset="0"/>
                                 </a:rPr>
                               </m:ctrlPr>
                             </m:dPr>
@@ -18470,7 +18532,7 @@
                             <m:sSubPr>
                               <m:ctrlPr>
                                 <a:rPr lang="en-US" i="1">
-                                  <a:latin typeface="Cambria Math" panose="02040503050406030204" pitchFamily="18" charset="0"/>
+                                  <a:latin typeface="Cambria Math" charset="0"/>
                                 </a:rPr>
                               </m:ctrlPr>
                             </m:sSubPr>
@@ -18540,7 +18602,7 @@
                         <m:dPr>
                           <m:ctrlPr>
                             <a:rPr lang="en-US" i="1">
-                              <a:latin typeface="Cambria Math" panose="02040503050406030204" pitchFamily="18" charset="0"/>
+                              <a:latin typeface="Cambria Math" charset="0"/>
                             </a:rPr>
                           </m:ctrlPr>
                         </m:dPr>
@@ -18579,7 +18641,7 @@
                       <m:dPr>
                         <m:ctrlPr>
                           <a:rPr lang="en-US" i="1">
-                            <a:latin typeface="Cambria Math" panose="02040503050406030204" pitchFamily="18" charset="0"/>
+                            <a:latin typeface="Cambria Math" charset="0"/>
                           </a:rPr>
                         </m:ctrlPr>
                       </m:dPr>
@@ -18606,7 +18668,7 @@
                       <m:sSubPr>
                         <m:ctrlPr>
                           <a:rPr lang="en-US" b="0" i="1" smtClean="0">
-                            <a:latin typeface="Cambria Math" panose="02040503050406030204" pitchFamily="18" charset="0"/>
+                            <a:latin typeface="Cambria Math" charset="0"/>
                           </a:rPr>
                         </m:ctrlPr>
                       </m:sSubPr>
@@ -18637,7 +18699,7 @@
                       <m:dPr>
                         <m:ctrlPr>
                           <a:rPr lang="en-US" i="1">
-                            <a:latin typeface="Cambria Math" panose="02040503050406030204" pitchFamily="18" charset="0"/>
+                            <a:latin typeface="Cambria Math" charset="0"/>
                           </a:rPr>
                         </m:ctrlPr>
                       </m:dPr>
@@ -18792,7 +18854,7 @@
                       <m:sSubPr>
                         <m:ctrlPr>
                           <a:rPr lang="en-US" i="1">
-                            <a:latin typeface="Cambria Math" panose="02040503050406030204" pitchFamily="18" charset="0"/>
+                            <a:latin typeface="Cambria Math" charset="0"/>
                           </a:rPr>
                         </m:ctrlPr>
                       </m:sSubPr>
@@ -18830,7 +18892,7 @@
                       <m:sSubPr>
                         <m:ctrlPr>
                           <a:rPr lang="en-US" i="1">
-                            <a:latin typeface="Cambria Math" panose="02040503050406030204" pitchFamily="18" charset="0"/>
+                            <a:latin typeface="Cambria Math" charset="0"/>
                             <a:ea typeface="Cambria Math" panose="02040503050406030204" pitchFamily="18" charset="0"/>
                           </a:rPr>
                         </m:ctrlPr>
@@ -18889,7 +18951,7 @@
                         <m:dPr>
                           <m:ctrlPr>
                             <a:rPr lang="en-US" b="0" i="1" smtClean="0">
-                              <a:latin typeface="Cambria Math" panose="02040503050406030204" pitchFamily="18" charset="0"/>
+                              <a:latin typeface="Cambria Math" charset="0"/>
                             </a:rPr>
                           </m:ctrlPr>
                         </m:dPr>
@@ -18898,7 +18960,7 @@
                             <m:sSubPr>
                               <m:ctrlPr>
                                 <a:rPr lang="en-US" b="0" i="1" smtClean="0">
-                                  <a:latin typeface="Cambria Math" panose="02040503050406030204" pitchFamily="18" charset="0"/>
+                                  <a:latin typeface="Cambria Math" charset="0"/>
                                 </a:rPr>
                               </m:ctrlPr>
                             </m:sSubPr>
@@ -18944,7 +19006,7 @@
                         <m:sSubPr>
                           <m:ctrlPr>
                             <a:rPr lang="en-US" i="1">
-                              <a:latin typeface="Cambria Math" panose="02040503050406030204" pitchFamily="18" charset="0"/>
+                              <a:latin typeface="Cambria Math" charset="0"/>
                               <a:ea typeface="Cambria Math" panose="02040503050406030204" pitchFamily="18" charset="0"/>
                             </a:rPr>
                           </m:ctrlPr>
@@ -19032,7 +19094,7 @@
                       <m:dPr>
                         <m:ctrlPr>
                           <a:rPr lang="en-US" i="1">
-                            <a:latin typeface="Cambria Math" panose="02040503050406030204" pitchFamily="18" charset="0"/>
+                            <a:latin typeface="Cambria Math" charset="0"/>
                           </a:rPr>
                         </m:ctrlPr>
                       </m:dPr>
@@ -19063,7 +19125,7 @@
                       <m:dPr>
                         <m:ctrlPr>
                           <a:rPr lang="en-US" i="1">
-                            <a:latin typeface="Cambria Math" panose="02040503050406030204" pitchFamily="18" charset="0"/>
+                            <a:latin typeface="Cambria Math" charset="0"/>
                           </a:rPr>
                         </m:ctrlPr>
                       </m:dPr>
@@ -19108,7 +19170,7 @@
                       <m:dPr>
                         <m:ctrlPr>
                           <a:rPr lang="en-US" i="1">
-                            <a:latin typeface="Cambria Math" panose="02040503050406030204" pitchFamily="18" charset="0"/>
+                            <a:latin typeface="Cambria Math" charset="0"/>
                           </a:rPr>
                         </m:ctrlPr>
                       </m:dPr>
@@ -19143,7 +19205,7 @@
                       <m:dPr>
                         <m:ctrlPr>
                           <a:rPr lang="en-US" i="1">
-                            <a:latin typeface="Cambria Math" panose="02040503050406030204" pitchFamily="18" charset="0"/>
+                            <a:latin typeface="Cambria Math" charset="0"/>
                           </a:rPr>
                         </m:ctrlPr>
                       </m:dPr>
@@ -19178,7 +19240,7 @@
                       <m:dPr>
                         <m:ctrlPr>
                           <a:rPr lang="en-US" i="1">
-                            <a:latin typeface="Cambria Math" panose="02040503050406030204" pitchFamily="18" charset="0"/>
+                            <a:latin typeface="Cambria Math" charset="0"/>
                           </a:rPr>
                         </m:ctrlPr>
                       </m:dPr>
@@ -19411,11 +19473,7 @@
           <a:p>
             <a:r>
               <a:rPr lang="en-US" dirty="0" smtClean="0"/>
-              <a:t>Existing </a:t>
-            </a:r>
-            <a:r>
-              <a:rPr lang="en-US" dirty="0" smtClean="0"/>
-              <a:t>Ideas</a:t>
+              <a:t>Existing Ideas</a:t>
             </a:r>
             <a:endParaRPr lang="en-US" dirty="0"/>
           </a:p>
@@ -19445,45 +19503,20 @@
           <a:p>
             <a:r>
               <a:rPr lang="en-US" dirty="0" smtClean="0"/>
-              <a:t>Non-linearity </a:t>
+              <a:t>Non-linearity in dynamics + Limited linear sensors-&gt; Active Sensing</a:t>
             </a:r>
+          </a:p>
+          <a:p>
             <a:r>
               <a:rPr lang="en-US" dirty="0" smtClean="0"/>
-              <a:t>in dynamics + Limited linear sensors-&gt; Active Sensing</a:t>
+              <a:t>Identify two different sub-manifolds which are partially observable</a:t>
             </a:r>
           </a:p>
           <a:p>
             <a:r>
               <a:rPr lang="en-US" dirty="0" smtClean="0"/>
-              <a:t>Identify </a:t>
+              <a:t>Control to orient the sub-manifolds to result in Observability</a:t>
             </a:r>
-            <a:r>
-              <a:rPr lang="en-US" dirty="0" smtClean="0"/>
-              <a:t>two different </a:t>
-            </a:r>
-            <a:r>
-              <a:rPr lang="en-US" dirty="0" smtClean="0"/>
-              <a:t>sub-manifolds </a:t>
-            </a:r>
-            <a:r>
-              <a:rPr lang="en-US" dirty="0" smtClean="0"/>
-              <a:t>which are partially </a:t>
-            </a:r>
-            <a:r>
-              <a:rPr lang="en-US" dirty="0" smtClean="0"/>
-              <a:t>observable</a:t>
-            </a:r>
-          </a:p>
-          <a:p>
-            <a:r>
-              <a:rPr lang="en-US" dirty="0" smtClean="0"/>
-              <a:t>Control to orient the sub-manifolds to result in </a:t>
-            </a:r>
-            <a:r>
-              <a:rPr lang="en-US" dirty="0" smtClean="0"/>
-              <a:t>Observability</a:t>
-            </a:r>
-            <a:endParaRPr lang="en-US" dirty="0" smtClean="0"/>
           </a:p>
         </p:txBody>
       </p:sp>

</xml_diff>